<commit_message>
add new slide in js file
</commit_message>
<xml_diff>
--- a/LEARNING.NOTE/vscode.pptx
+++ b/LEARNING.NOTE/vscode.pptx
@@ -246,7 +246,7 @@
           <a:p>
             <a:fld id="{5FA3847D-9A14-4D57-B422-ADEC39080740}" type="datetimeFigureOut">
               <a:rPr lang="en-US" smtClean="0"/>
-              <a:t>10/2/2023</a:t>
+              <a:t>11/2/2023</a:t>
             </a:fld>
             <a:endParaRPr lang="en-US"/>
           </a:p>
@@ -414,7 +414,7 @@
           <a:p>
             <a:fld id="{5FA3847D-9A14-4D57-B422-ADEC39080740}" type="datetimeFigureOut">
               <a:rPr lang="en-US" smtClean="0"/>
-              <a:t>10/2/2023</a:t>
+              <a:t>11/2/2023</a:t>
             </a:fld>
             <a:endParaRPr lang="en-US"/>
           </a:p>
@@ -592,7 +592,7 @@
           <a:p>
             <a:fld id="{5FA3847D-9A14-4D57-B422-ADEC39080740}" type="datetimeFigureOut">
               <a:rPr lang="en-US" smtClean="0"/>
-              <a:t>10/2/2023</a:t>
+              <a:t>11/2/2023</a:t>
             </a:fld>
             <a:endParaRPr lang="en-US"/>
           </a:p>
@@ -760,7 +760,7 @@
           <a:p>
             <a:fld id="{5FA3847D-9A14-4D57-B422-ADEC39080740}" type="datetimeFigureOut">
               <a:rPr lang="en-US" smtClean="0"/>
-              <a:t>10/2/2023</a:t>
+              <a:t>11/2/2023</a:t>
             </a:fld>
             <a:endParaRPr lang="en-US"/>
           </a:p>
@@ -1005,7 +1005,7 @@
           <a:p>
             <a:fld id="{5FA3847D-9A14-4D57-B422-ADEC39080740}" type="datetimeFigureOut">
               <a:rPr lang="en-US" smtClean="0"/>
-              <a:t>10/2/2023</a:t>
+              <a:t>11/2/2023</a:t>
             </a:fld>
             <a:endParaRPr lang="en-US"/>
           </a:p>
@@ -1234,7 +1234,7 @@
           <a:p>
             <a:fld id="{5FA3847D-9A14-4D57-B422-ADEC39080740}" type="datetimeFigureOut">
               <a:rPr lang="en-US" smtClean="0"/>
-              <a:t>10/2/2023</a:t>
+              <a:t>11/2/2023</a:t>
             </a:fld>
             <a:endParaRPr lang="en-US"/>
           </a:p>
@@ -1598,7 +1598,7 @@
           <a:p>
             <a:fld id="{5FA3847D-9A14-4D57-B422-ADEC39080740}" type="datetimeFigureOut">
               <a:rPr lang="en-US" smtClean="0"/>
-              <a:t>10/2/2023</a:t>
+              <a:t>11/2/2023</a:t>
             </a:fld>
             <a:endParaRPr lang="en-US"/>
           </a:p>
@@ -1715,7 +1715,7 @@
           <a:p>
             <a:fld id="{5FA3847D-9A14-4D57-B422-ADEC39080740}" type="datetimeFigureOut">
               <a:rPr lang="en-US" smtClean="0"/>
-              <a:t>10/2/2023</a:t>
+              <a:t>11/2/2023</a:t>
             </a:fld>
             <a:endParaRPr lang="en-US"/>
           </a:p>
@@ -1810,7 +1810,7 @@
           <a:p>
             <a:fld id="{5FA3847D-9A14-4D57-B422-ADEC39080740}" type="datetimeFigureOut">
               <a:rPr lang="en-US" smtClean="0"/>
-              <a:t>10/2/2023</a:t>
+              <a:t>11/2/2023</a:t>
             </a:fld>
             <a:endParaRPr lang="en-US"/>
           </a:p>
@@ -2085,7 +2085,7 @@
           <a:p>
             <a:fld id="{5FA3847D-9A14-4D57-B422-ADEC39080740}" type="datetimeFigureOut">
               <a:rPr lang="en-US" smtClean="0"/>
-              <a:t>10/2/2023</a:t>
+              <a:t>11/2/2023</a:t>
             </a:fld>
             <a:endParaRPr lang="en-US"/>
           </a:p>
@@ -2337,7 +2337,7 @@
           <a:p>
             <a:fld id="{5FA3847D-9A14-4D57-B422-ADEC39080740}" type="datetimeFigureOut">
               <a:rPr lang="en-US" smtClean="0"/>
-              <a:t>10/2/2023</a:t>
+              <a:t>11/2/2023</a:t>
             </a:fld>
             <a:endParaRPr lang="en-US"/>
           </a:p>
@@ -2548,7 +2548,7 @@
           <a:p>
             <a:fld id="{5FA3847D-9A14-4D57-B422-ADEC39080740}" type="datetimeFigureOut">
               <a:rPr lang="en-US" smtClean="0"/>
-              <a:t>10/2/2023</a:t>
+              <a:t>11/2/2023</a:t>
             </a:fld>
             <a:endParaRPr lang="en-US"/>
           </a:p>
@@ -4021,6 +4021,48 @@
           </a:p>
         </p:txBody>
       </p:sp>
+      <p:sp>
+        <p:nvSpPr>
+          <p:cNvPr id="3" name="TextBox 2">
+            <a:extLst>
+              <a:ext uri="{FF2B5EF4-FFF2-40B4-BE49-F238E27FC236}">
+                <a16:creationId xmlns:a16="http://schemas.microsoft.com/office/drawing/2014/main" id="{B5417910-4B5D-0BB7-AFD7-E85CC2B4256B}"/>
+              </a:ext>
+            </a:extLst>
+          </p:cNvPr>
+          <p:cNvSpPr txBox="1"/>
+          <p:nvPr/>
+        </p:nvSpPr>
+        <p:spPr>
+          <a:xfrm>
+            <a:off x="735104" y="5622948"/>
+            <a:ext cx="5037621" cy="954107"/>
+          </a:xfrm>
+          <a:prstGeom prst="rect">
+            <a:avLst/>
+          </a:prstGeom>
+          <a:noFill/>
+        </p:spPr>
+        <p:txBody>
+          <a:bodyPr wrap="square" rtlCol="0">
+            <a:spAutoFit/>
+          </a:bodyPr>
+          <a:lstStyle/>
+          <a:p>
+            <a:r>
+              <a:rPr lang="en-US" sz="2800" dirty="0"/>
+              <a:t>ctrl + k + c</a:t>
+            </a:r>
+          </a:p>
+          <a:p>
+            <a:r>
+              <a:rPr lang="fa-IR" sz="2800" dirty="0"/>
+              <a:t>کامنت کردن کدهای انتخاب شده</a:t>
+            </a:r>
+            <a:endParaRPr lang="en-US" sz="2800" dirty="0"/>
+          </a:p>
+        </p:txBody>
+      </p:sp>
     </p:spTree>
     <p:extLst>
       <p:ext uri="{BB962C8B-B14F-4D97-AF65-F5344CB8AC3E}">

</xml_diff>